<commit_message>
modify order of aws introduction - move ingress, compute and data storage layer slide further forward
</commit_message>
<xml_diff>
--- a/aws-introduction/aws-introduction.pptx
+++ b/aws-introduction/aws-introduction.pptx
@@ -26,11 +26,11 @@
     <p:sldId id="285" r:id="rId17"/>
     <p:sldId id="286" r:id="rId18"/>
     <p:sldId id="302" r:id="rId19"/>
-    <p:sldId id="288" r:id="rId20"/>
-    <p:sldId id="290" r:id="rId21"/>
-    <p:sldId id="305" r:id="rId22"/>
-    <p:sldId id="282" r:id="rId23"/>
-    <p:sldId id="284" r:id="rId24"/>
+    <p:sldId id="282" r:id="rId20"/>
+    <p:sldId id="284" r:id="rId21"/>
+    <p:sldId id="288" r:id="rId22"/>
+    <p:sldId id="290" r:id="rId23"/>
+    <p:sldId id="305" r:id="rId24"/>
     <p:sldId id="303" r:id="rId25"/>
     <p:sldId id="280" r:id="rId26"/>
   </p:sldIdLst>
@@ -238,7 +238,7 @@
           <a:p>
             <a:fld id="{1B6676A5-1300-B945-98B1-DD92DDC3A3CB}" type="datetimeFigureOut">
               <a:rPr lang="en-US" smtClean="0"/>
-              <a:t>11/22/15</a:t>
+              <a:t>12/2/15</a:t>
             </a:fld>
             <a:endParaRPr lang="en-US"/>
           </a:p>
@@ -1363,166 +1363,7 @@
           <a:bodyPr/>
           <a:lstStyle/>
           <a:p>
-            <a:pPr marL="0" indent="0">
-              <a:buFont typeface="Arial"/>
-              <a:buNone/>
-            </a:pPr>
-            <a:r>
-              <a:rPr lang="en-US" baseline="0" dirty="0" smtClean="0"/>
-              <a:t>S3:</a:t>
-            </a:r>
-          </a:p>
-          <a:p>
-            <a:pPr marL="171450" indent="-171450">
-              <a:buFont typeface="Arial"/>
-              <a:buChar char="•"/>
-            </a:pPr>
-            <a:r>
-              <a:rPr lang="en-US" baseline="0" dirty="0" smtClean="0"/>
-              <a:t>One of the few AWS Services with an SLA</a:t>
-            </a:r>
-          </a:p>
-          <a:p>
-            <a:pPr marL="171450" indent="-171450">
-              <a:buFont typeface="Arial"/>
-              <a:buChar char="•"/>
-            </a:pPr>
-            <a:r>
-              <a:rPr lang="en-US" baseline="0" dirty="0" smtClean="0"/>
-              <a:t>Variable Performance</a:t>
-            </a:r>
-          </a:p>
-          <a:p>
-            <a:pPr marL="171450" indent="-171450">
-              <a:buFont typeface="Arial"/>
-              <a:buChar char="•"/>
-            </a:pPr>
-            <a:r>
-              <a:rPr lang="en-US" baseline="0" dirty="0" smtClean="0"/>
-              <a:t>Performance Optimizations are Available (http://</a:t>
-            </a:r>
-            <a:r>
-              <a:rPr lang="en-US" baseline="0" dirty="0" err="1" smtClean="0"/>
-              <a:t>docs.aws.amazon.com</a:t>
-            </a:r>
-            <a:r>
-              <a:rPr lang="en-US" baseline="0" dirty="0" smtClean="0"/>
-              <a:t>/AmazonS3/latest/</a:t>
-            </a:r>
-            <a:r>
-              <a:rPr lang="en-US" baseline="0" dirty="0" err="1" smtClean="0"/>
-              <a:t>dev</a:t>
-            </a:r>
-            <a:r>
-              <a:rPr lang="en-US" baseline="0" dirty="0" smtClean="0"/>
-              <a:t>/request-rate-</a:t>
-            </a:r>
-            <a:r>
-              <a:rPr lang="en-US" baseline="0" dirty="0" err="1" smtClean="0"/>
-              <a:t>perf</a:t>
-            </a:r>
-            <a:r>
-              <a:rPr lang="en-US" baseline="0" dirty="0" smtClean="0"/>
-              <a:t>-</a:t>
-            </a:r>
-            <a:r>
-              <a:rPr lang="en-US" baseline="0" dirty="0" err="1" smtClean="0"/>
-              <a:t>considerations.html</a:t>
-            </a:r>
-            <a:r>
-              <a:rPr lang="en-US" baseline="0" dirty="0" smtClean="0"/>
-              <a:t>)</a:t>
-            </a:r>
-          </a:p>
-          <a:p>
-            <a:pPr marL="0" indent="0">
-              <a:buFont typeface="Arial"/>
-              <a:buNone/>
-            </a:pPr>
-            <a:r>
-              <a:rPr lang="en-US" baseline="0" dirty="0" smtClean="0"/>
-              <a:t>RDS:</a:t>
-            </a:r>
-          </a:p>
-          <a:p>
-            <a:pPr marL="171450" indent="-171450">
-              <a:buFont typeface="Arial"/>
-              <a:buChar char="•"/>
-            </a:pPr>
-            <a:r>
-              <a:rPr lang="en-US" baseline="0" dirty="0" smtClean="0"/>
-              <a:t>EC2 Backed by EBS</a:t>
-            </a:r>
-          </a:p>
-          <a:p>
-            <a:pPr marL="171450" indent="-171450">
-              <a:buFont typeface="Arial"/>
-              <a:buChar char="•"/>
-            </a:pPr>
-            <a:r>
-              <a:rPr lang="en-US" baseline="0" dirty="0" smtClean="0"/>
-              <a:t>Not all </a:t>
-            </a:r>
-            <a:r>
-              <a:rPr lang="en-US" baseline="0" dirty="0" err="1" smtClean="0"/>
-              <a:t>tunables</a:t>
-            </a:r>
-            <a:r>
-              <a:rPr lang="en-US" baseline="0" dirty="0" smtClean="0"/>
-              <a:t> are exposed</a:t>
-            </a:r>
-          </a:p>
-          <a:p>
-            <a:pPr marL="171450" indent="-171450">
-              <a:buFont typeface="Arial"/>
-              <a:buChar char="•"/>
-            </a:pPr>
-            <a:r>
-              <a:rPr lang="en-US" baseline="0" dirty="0" smtClean="0"/>
-              <a:t>Multi-AZ has not been foolproof – for instance, the June 29, 2012 outage triggered failover events that failed to bring about database availability: http://</a:t>
-            </a:r>
-            <a:r>
-              <a:rPr lang="en-US" baseline="0" dirty="0" err="1" smtClean="0"/>
-              <a:t>aws.amazon.com</a:t>
-            </a:r>
-            <a:r>
-              <a:rPr lang="en-US" baseline="0" dirty="0" smtClean="0"/>
-              <a:t>/message/67457/. Bug since resolved.</a:t>
-            </a:r>
-          </a:p>
-          <a:p>
-            <a:pPr marL="0" indent="0">
-              <a:buFont typeface="Arial"/>
-              <a:buNone/>
-            </a:pPr>
-            <a:r>
-              <a:rPr lang="en-US" baseline="0" dirty="0" smtClean="0"/>
-              <a:t>EBS:</a:t>
-            </a:r>
-          </a:p>
-          <a:p>
-            <a:pPr marL="171450" indent="-171450">
-              <a:buFont typeface="Arial"/>
-              <a:buChar char="•"/>
-            </a:pPr>
-            <a:r>
-              <a:rPr lang="en-US" baseline="0" dirty="0" smtClean="0"/>
-              <a:t>No feature exists to replicate an EBS volume across availability zones in real-time, frequently resulting in single-AZ systems</a:t>
-            </a:r>
-          </a:p>
-          <a:p>
-            <a:pPr marL="0" indent="0">
-              <a:buFont typeface="Arial"/>
-              <a:buNone/>
-            </a:pPr>
-            <a:endParaRPr lang="en-US" baseline="0" dirty="0" smtClean="0"/>
-          </a:p>
-          <a:p>
-            <a:pPr marL="0" indent="0">
-              <a:buFont typeface="Arial"/>
-              <a:buNone/>
-            </a:pPr>
-            <a:endParaRPr lang="en-US" baseline="0" dirty="0" smtClean="0"/>
+            <a:endParaRPr lang="en-US" dirty="0"/>
           </a:p>
         </p:txBody>
       </p:sp>
@@ -1552,7 +1393,7 @@
     </p:spTree>
     <p:extLst>
       <p:ext uri="{BB962C8B-B14F-4D97-AF65-F5344CB8AC3E}">
-        <p14:creationId xmlns:p14="http://schemas.microsoft.com/office/powerpoint/2010/main" val="3463813937"/>
+        <p14:creationId xmlns:p14="http://schemas.microsoft.com/office/powerpoint/2010/main" val="4236847584"/>
       </p:ext>
     </p:extLst>
   </p:cSld>
@@ -1698,6 +1539,161 @@
               <a:buFont typeface="Arial"/>
               <a:buNone/>
             </a:pPr>
+            <a:r>
+              <a:rPr lang="en-US" baseline="0" dirty="0" smtClean="0"/>
+              <a:t>S3:</a:t>
+            </a:r>
+          </a:p>
+          <a:p>
+            <a:pPr marL="171450" indent="-171450">
+              <a:buFont typeface="Arial"/>
+              <a:buChar char="•"/>
+            </a:pPr>
+            <a:r>
+              <a:rPr lang="en-US" baseline="0" dirty="0" smtClean="0"/>
+              <a:t>One of the few AWS Services with an SLA</a:t>
+            </a:r>
+          </a:p>
+          <a:p>
+            <a:pPr marL="171450" indent="-171450">
+              <a:buFont typeface="Arial"/>
+              <a:buChar char="•"/>
+            </a:pPr>
+            <a:r>
+              <a:rPr lang="en-US" baseline="0" dirty="0" smtClean="0"/>
+              <a:t>Variable Performance</a:t>
+            </a:r>
+          </a:p>
+          <a:p>
+            <a:pPr marL="171450" indent="-171450">
+              <a:buFont typeface="Arial"/>
+              <a:buChar char="•"/>
+            </a:pPr>
+            <a:r>
+              <a:rPr lang="en-US" baseline="0" dirty="0" smtClean="0"/>
+              <a:t>Performance Optimizations are Available (http://</a:t>
+            </a:r>
+            <a:r>
+              <a:rPr lang="en-US" baseline="0" dirty="0" err="1" smtClean="0"/>
+              <a:t>docs.aws.amazon.com</a:t>
+            </a:r>
+            <a:r>
+              <a:rPr lang="en-US" baseline="0" dirty="0" smtClean="0"/>
+              <a:t>/AmazonS3/latest/</a:t>
+            </a:r>
+            <a:r>
+              <a:rPr lang="en-US" baseline="0" dirty="0" err="1" smtClean="0"/>
+              <a:t>dev</a:t>
+            </a:r>
+            <a:r>
+              <a:rPr lang="en-US" baseline="0" dirty="0" smtClean="0"/>
+              <a:t>/request-rate-</a:t>
+            </a:r>
+            <a:r>
+              <a:rPr lang="en-US" baseline="0" dirty="0" err="1" smtClean="0"/>
+              <a:t>perf</a:t>
+            </a:r>
+            <a:r>
+              <a:rPr lang="en-US" baseline="0" dirty="0" smtClean="0"/>
+              <a:t>-</a:t>
+            </a:r>
+            <a:r>
+              <a:rPr lang="en-US" baseline="0" dirty="0" err="1" smtClean="0"/>
+              <a:t>considerations.html</a:t>
+            </a:r>
+            <a:r>
+              <a:rPr lang="en-US" baseline="0" dirty="0" smtClean="0"/>
+              <a:t>)</a:t>
+            </a:r>
+          </a:p>
+          <a:p>
+            <a:pPr marL="0" indent="0">
+              <a:buFont typeface="Arial"/>
+              <a:buNone/>
+            </a:pPr>
+            <a:r>
+              <a:rPr lang="en-US" baseline="0" dirty="0" smtClean="0"/>
+              <a:t>RDS:</a:t>
+            </a:r>
+          </a:p>
+          <a:p>
+            <a:pPr marL="171450" indent="-171450">
+              <a:buFont typeface="Arial"/>
+              <a:buChar char="•"/>
+            </a:pPr>
+            <a:r>
+              <a:rPr lang="en-US" baseline="0" dirty="0" smtClean="0"/>
+              <a:t>EC2 Backed by EBS</a:t>
+            </a:r>
+          </a:p>
+          <a:p>
+            <a:pPr marL="171450" indent="-171450">
+              <a:buFont typeface="Arial"/>
+              <a:buChar char="•"/>
+            </a:pPr>
+            <a:r>
+              <a:rPr lang="en-US" baseline="0" dirty="0" smtClean="0"/>
+              <a:t>Not all </a:t>
+            </a:r>
+            <a:r>
+              <a:rPr lang="en-US" baseline="0" dirty="0" err="1" smtClean="0"/>
+              <a:t>tunables</a:t>
+            </a:r>
+            <a:r>
+              <a:rPr lang="en-US" baseline="0" dirty="0" smtClean="0"/>
+              <a:t> are exposed</a:t>
+            </a:r>
+          </a:p>
+          <a:p>
+            <a:pPr marL="171450" indent="-171450">
+              <a:buFont typeface="Arial"/>
+              <a:buChar char="•"/>
+            </a:pPr>
+            <a:r>
+              <a:rPr lang="en-US" baseline="0" dirty="0" smtClean="0"/>
+              <a:t>Multi-AZ has not been foolproof – for instance, the June 29, 2012 outage triggered failover events that failed to bring about database availability: http://</a:t>
+            </a:r>
+            <a:r>
+              <a:rPr lang="en-US" baseline="0" dirty="0" err="1" smtClean="0"/>
+              <a:t>aws.amazon.com</a:t>
+            </a:r>
+            <a:r>
+              <a:rPr lang="en-US" baseline="0" dirty="0" smtClean="0"/>
+              <a:t>/message/67457/. Bug since resolved.</a:t>
+            </a:r>
+          </a:p>
+          <a:p>
+            <a:pPr marL="0" indent="0">
+              <a:buFont typeface="Arial"/>
+              <a:buNone/>
+            </a:pPr>
+            <a:r>
+              <a:rPr lang="en-US" baseline="0" dirty="0" smtClean="0"/>
+              <a:t>EBS:</a:t>
+            </a:r>
+          </a:p>
+          <a:p>
+            <a:pPr marL="171450" indent="-171450">
+              <a:buFont typeface="Arial"/>
+              <a:buChar char="•"/>
+            </a:pPr>
+            <a:r>
+              <a:rPr lang="en-US" baseline="0" dirty="0" smtClean="0"/>
+              <a:t>No feature exists to replicate an EBS volume across availability zones in real-time, frequently resulting in single-AZ systems</a:t>
+            </a:r>
+          </a:p>
+          <a:p>
+            <a:pPr marL="0" indent="0">
+              <a:buFont typeface="Arial"/>
+              <a:buNone/>
+            </a:pPr>
+            <a:endParaRPr lang="en-US" baseline="0" dirty="0" smtClean="0"/>
+          </a:p>
+          <a:p>
+            <a:pPr marL="0" indent="0">
+              <a:buFont typeface="Arial"/>
+              <a:buNone/>
+            </a:pPr>
             <a:endParaRPr lang="en-US" baseline="0" dirty="0" smtClean="0"/>
           </a:p>
         </p:txBody>
@@ -1900,7 +1896,11 @@
           <a:bodyPr/>
           <a:lstStyle/>
           <a:p>
-            <a:endParaRPr lang="en-US" dirty="0"/>
+            <a:pPr marL="0" indent="0">
+              <a:buFont typeface="Arial"/>
+              <a:buNone/>
+            </a:pPr>
+            <a:endParaRPr lang="en-US" baseline="0" dirty="0" smtClean="0"/>
           </a:p>
         </p:txBody>
       </p:sp>
@@ -1930,7 +1930,7 @@
     </p:spTree>
     <p:extLst>
       <p:ext uri="{BB962C8B-B14F-4D97-AF65-F5344CB8AC3E}">
-        <p14:creationId xmlns:p14="http://schemas.microsoft.com/office/powerpoint/2010/main" val="4236847584"/>
+        <p14:creationId xmlns:p14="http://schemas.microsoft.com/office/powerpoint/2010/main" val="3463813937"/>
       </p:ext>
     </p:extLst>
   </p:cSld>
@@ -4957,7 +4957,7 @@
           <a:p>
             <a:fld id="{7CE38E4D-051A-41E1-86A4-E56916468FD0}" type="datetimeFigureOut">
               <a:rPr lang="en-US" smtClean="0"/>
-              <a:t>11/22/15</a:t>
+              <a:t>12/2/15</a:t>
             </a:fld>
             <a:endParaRPr lang="en-US"/>
           </a:p>
@@ -5162,7 +5162,7 @@
           <a:p>
             <a:fld id="{7CE38E4D-051A-41E1-86A4-E56916468FD0}" type="datetimeFigureOut">
               <a:rPr lang="en-US" smtClean="0"/>
-              <a:t>11/22/15</a:t>
+              <a:t>12/2/15</a:t>
             </a:fld>
             <a:endParaRPr lang="en-US"/>
           </a:p>
@@ -5313,7 +5313,7 @@
           <a:p>
             <a:fld id="{7CE38E4D-051A-41E1-86A4-E56916468FD0}" type="datetimeFigureOut">
               <a:rPr lang="en-US" smtClean="0"/>
-              <a:t>11/22/15</a:t>
+              <a:t>12/2/15</a:t>
             </a:fld>
             <a:endParaRPr lang="en-US"/>
           </a:p>
@@ -7139,7 +7139,7 @@
           <a:p>
             <a:fld id="{7CE38E4D-051A-41E1-86A4-E56916468FD0}" type="datetimeFigureOut">
               <a:rPr lang="en-US" smtClean="0"/>
-              <a:t>11/22/15</a:t>
+              <a:t>12/2/15</a:t>
             </a:fld>
             <a:endParaRPr lang="en-US"/>
           </a:p>
@@ -9009,7 +9009,7 @@
           <a:p>
             <a:fld id="{7CE38E4D-051A-41E1-86A4-E56916468FD0}" type="datetimeFigureOut">
               <a:rPr lang="en-US" smtClean="0"/>
-              <a:t>11/22/15</a:t>
+              <a:t>12/2/15</a:t>
             </a:fld>
             <a:endParaRPr lang="en-US"/>
           </a:p>
@@ -9122,7 +9122,7 @@
           <a:p>
             <a:fld id="{7CE38E4D-051A-41E1-86A4-E56916468FD0}" type="datetimeFigureOut">
               <a:rPr lang="en-US" smtClean="0"/>
-              <a:t>11/22/15</a:t>
+              <a:t>12/2/15</a:t>
             </a:fld>
             <a:endParaRPr lang="en-US"/>
           </a:p>
@@ -9663,7 +9663,7 @@
           <a:p>
             <a:fld id="{7CE38E4D-051A-41E1-86A4-E56916468FD0}" type="datetimeFigureOut">
               <a:rPr lang="en-US" smtClean="0"/>
-              <a:t>11/22/15</a:t>
+              <a:t>12/2/15</a:t>
             </a:fld>
             <a:endParaRPr lang="en-US"/>
           </a:p>
@@ -9776,7 +9776,7 @@
           <a:p>
             <a:fld id="{7CE38E4D-051A-41E1-86A4-E56916468FD0}" type="datetimeFigureOut">
               <a:rPr lang="en-US" smtClean="0"/>
-              <a:t>11/22/15</a:t>
+              <a:t>12/2/15</a:t>
             </a:fld>
             <a:endParaRPr lang="en-US"/>
           </a:p>
@@ -11487,7 +11487,7 @@
           <a:p>
             <a:fld id="{7CE38E4D-051A-41E1-86A4-E56916468FD0}" type="datetimeFigureOut">
               <a:rPr lang="en-US" smtClean="0"/>
-              <a:t>11/22/15</a:t>
+              <a:t>12/2/15</a:t>
             </a:fld>
             <a:endParaRPr lang="en-US"/>
           </a:p>
@@ -11638,7 +11638,7 @@
           <a:p>
             <a:fld id="{7CE38E4D-051A-41E1-86A4-E56916468FD0}" type="datetimeFigureOut">
               <a:rPr lang="en-US" smtClean="0"/>
-              <a:t>11/22/15</a:t>
+              <a:t>12/2/15</a:t>
             </a:fld>
             <a:endParaRPr lang="en-US"/>
           </a:p>
@@ -15254,7 +15254,7 @@
           <a:p>
             <a:fld id="{7CE38E4D-051A-41E1-86A4-E56916468FD0}" type="datetimeFigureOut">
               <a:rPr lang="en-US" smtClean="0"/>
-              <a:t>11/22/15</a:t>
+              <a:t>12/2/15</a:t>
             </a:fld>
             <a:endParaRPr lang="en-US"/>
           </a:p>
@@ -17113,7 +17113,7 @@
           <a:p>
             <a:fld id="{7CE38E4D-051A-41E1-86A4-E56916468FD0}" type="datetimeFigureOut">
               <a:rPr lang="en-US" smtClean="0"/>
-              <a:t>11/22/15</a:t>
+              <a:t>12/2/15</a:t>
             </a:fld>
             <a:endParaRPr lang="en-US"/>
           </a:p>
@@ -19248,11 +19248,7 @@
             </a:r>
             <a:r>
               <a:rPr lang="en-US" dirty="0" smtClean="0"/>
-              <a:t>Create </a:t>
-            </a:r>
-            <a:r>
-              <a:rPr lang="en-US" dirty="0" smtClean="0"/>
-              <a:t>an EC2 Instance</a:t>
+              <a:t>Create an EC2 Instance</a:t>
             </a:r>
             <a:endParaRPr lang="en-US" dirty="0"/>
           </a:p>
@@ -19316,125 +19312,45 @@
         <p:spPr/>
         <p:txBody>
           <a:bodyPr>
-            <a:normAutofit fontScale="85000" lnSpcReduction="20000"/>
+            <a:normAutofit/>
           </a:bodyPr>
           <a:lstStyle/>
           <a:p>
+            <a:pPr lvl="1"/>
             <a:r>
               <a:rPr lang="en-US" dirty="0" smtClean="0"/>
-              <a:t>ELB: Elastic Load Balancer</a:t>
+              <a:t>Ingress: ELB, SQS or other Ingress</a:t>
             </a:r>
           </a:p>
           <a:p>
             <a:pPr lvl="1"/>
             <a:r>
               <a:rPr lang="en-US" dirty="0" smtClean="0"/>
-              <a:t>Immediate Response</a:t>
-            </a:r>
+              <a:t>Compute: </a:t>
+            </a:r>
+            <a:r>
+              <a:rPr lang="en-US" dirty="0" smtClean="0"/>
+              <a:t>EC2 Instances, ideally an Auto Scaling Group</a:t>
+            </a:r>
+            <a:endParaRPr lang="en-US" dirty="0" smtClean="0"/>
           </a:p>
           <a:p>
             <a:pPr lvl="1"/>
             <a:r>
               <a:rPr lang="en-US" dirty="0" smtClean="0"/>
-              <a:t>Distribute Requests amongst  EC2 Instances</a:t>
-            </a:r>
-          </a:p>
-          <a:p>
-            <a:pPr lvl="1"/>
+              <a:t>Data Storage: RDS, S3, </a:t>
+            </a:r>
+            <a:r>
+              <a:rPr lang="en-US" dirty="0" err="1" smtClean="0"/>
+              <a:t>DynamoDB</a:t>
+            </a:r>
+            <a:r>
+              <a:rPr lang="en-US" dirty="0"/>
+              <a:t> </a:t>
+            </a:r>
             <a:r>
               <a:rPr lang="en-US" dirty="0" smtClean="0"/>
-              <a:t>Built-in </a:t>
-            </a:r>
-            <a:r>
-              <a:rPr lang="en-US" dirty="0" err="1" smtClean="0"/>
-              <a:t>CloudWatch</a:t>
-            </a:r>
-            <a:r>
-              <a:rPr lang="en-US" dirty="0" smtClean="0"/>
-              <a:t> Metrics Allow Auto Scaling</a:t>
-            </a:r>
-          </a:p>
-          <a:p>
-            <a:r>
-              <a:rPr lang="en-US" dirty="0" smtClean="0"/>
-              <a:t>SQS: Simple Queue Service</a:t>
-            </a:r>
-          </a:p>
-          <a:p>
-            <a:pPr lvl="1"/>
-            <a:r>
-              <a:rPr lang="en-US" dirty="0" smtClean="0"/>
-              <a:t>Batch/Delayed Processing</a:t>
-            </a:r>
-          </a:p>
-          <a:p>
-            <a:pPr lvl="1"/>
-            <a:r>
-              <a:rPr lang="en-US" dirty="0" smtClean="0"/>
-              <a:t>Distribute Tasks amongst EC2 Instances</a:t>
-            </a:r>
-          </a:p>
-          <a:p>
-            <a:pPr lvl="1"/>
-            <a:r>
-              <a:rPr lang="en-US" dirty="0" smtClean="0"/>
-              <a:t>Built-in </a:t>
-            </a:r>
-            <a:r>
-              <a:rPr lang="en-US" dirty="0" err="1" smtClean="0"/>
-              <a:t>CloudWatch</a:t>
-            </a:r>
-            <a:r>
-              <a:rPr lang="en-US" dirty="0" smtClean="0"/>
-              <a:t> Metrics Allow Auto Scaling</a:t>
-            </a:r>
-          </a:p>
-          <a:p>
-            <a:r>
-              <a:rPr lang="en-US" dirty="0" smtClean="0"/>
-              <a:t>Other Ingress Methods:</a:t>
-            </a:r>
-          </a:p>
-          <a:p>
-            <a:pPr lvl="1"/>
-            <a:r>
-              <a:rPr lang="en-US" dirty="0" smtClean="0"/>
-              <a:t>Examples: </a:t>
-            </a:r>
-            <a:r>
-              <a:rPr lang="en-US" dirty="0" err="1" smtClean="0"/>
-              <a:t>ActiveMQ</a:t>
-            </a:r>
-            <a:r>
-              <a:rPr lang="en-US" dirty="0" smtClean="0"/>
-              <a:t>, </a:t>
-            </a:r>
-            <a:r>
-              <a:rPr lang="en-US" dirty="0" err="1" smtClean="0"/>
-              <a:t>Redis</a:t>
-            </a:r>
-            <a:r>
-              <a:rPr lang="en-US" dirty="0" smtClean="0"/>
-              <a:t>, various Proxies</a:t>
-            </a:r>
-          </a:p>
-          <a:p>
-            <a:pPr lvl="1"/>
-            <a:r>
-              <a:rPr lang="en-US" dirty="0" smtClean="0"/>
-              <a:t>If you need to Auto Scale, </a:t>
-            </a:r>
-            <a:r>
-              <a:rPr lang="en-US" smtClean="0"/>
-              <a:t>create custom </a:t>
-            </a:r>
-            <a:r>
-              <a:rPr lang="en-US" dirty="0" err="1" smtClean="0"/>
-              <a:t>CloudWatch</a:t>
-            </a:r>
-            <a:r>
-              <a:rPr lang="en-US" dirty="0" smtClean="0"/>
-              <a:t> Metrics</a:t>
+              <a:t>or other Data Storage</a:t>
             </a:r>
             <a:endParaRPr lang="en-US" dirty="0"/>
           </a:p>
@@ -19453,13 +19369,20 @@
         <p:spPr/>
         <p:txBody>
           <a:bodyPr>
-            <a:normAutofit/>
+            <a:normAutofit fontScale="90000"/>
           </a:bodyPr>
           <a:lstStyle/>
           <a:p>
             <a:r>
               <a:rPr lang="en-US" dirty="0" smtClean="0"/>
-              <a:t>Ingress: ELB, SQS or Other</a:t>
+              <a:t>AWS Architecture:</a:t>
+            </a:r>
+            <a:br>
+              <a:rPr lang="en-US" dirty="0" smtClean="0"/>
+            </a:br>
+            <a:r>
+              <a:rPr lang="en-US" dirty="0" smtClean="0"/>
+              <a:t>Typical Data Flow</a:t>
             </a:r>
             <a:endParaRPr lang="en-US" dirty="0"/>
           </a:p>
@@ -19468,7 +19391,7 @@
     </p:spTree>
     <p:extLst>
       <p:ext uri="{BB962C8B-B14F-4D97-AF65-F5344CB8AC3E}">
-        <p14:creationId xmlns:p14="http://schemas.microsoft.com/office/powerpoint/2010/main" val="3119918725"/>
+        <p14:creationId xmlns:p14="http://schemas.microsoft.com/office/powerpoint/2010/main" val="1959491456"/>
       </p:ext>
     </p:extLst>
   </p:cSld>
@@ -19716,221 +19639,53 @@
           <a:p>
             <a:r>
               <a:rPr lang="en-US" dirty="0" smtClean="0"/>
-              <a:t>Data Storage: RDS, </a:t>
-            </a:r>
-            <a:r>
-              <a:rPr lang="en-US" dirty="0" err="1" smtClean="0"/>
-              <a:t>DynamoDB</a:t>
-            </a:r>
-            <a:r>
-              <a:rPr lang="en-US" dirty="0" smtClean="0"/>
-              <a:t>,</a:t>
+              <a:t>AWS Architecture:</a:t>
             </a:r>
             <a:br>
               <a:rPr lang="en-US" dirty="0" smtClean="0"/>
             </a:br>
             <a:r>
               <a:rPr lang="en-US" dirty="0" smtClean="0"/>
-              <a:t>S3, EBS and EFS</a:t>
+              <a:t>Typical Data Flow</a:t>
             </a:r>
             <a:endParaRPr lang="en-US" dirty="0"/>
           </a:p>
         </p:txBody>
       </p:sp>
-      <p:sp>
-        <p:nvSpPr>
-          <p:cNvPr id="3" name="Content Placeholder 2"/>
-          <p:cNvSpPr>
-            <a:spLocks noGrp="1"/>
-          </p:cNvSpPr>
-          <p:nvPr>
-            <p:ph sz="quarter" idx="13"/>
-          </p:nvPr>
-        </p:nvSpPr>
-        <p:spPr/>
-        <p:txBody>
-          <a:bodyPr>
-            <a:normAutofit/>
-          </a:bodyPr>
-          <a:lstStyle/>
-          <a:p>
-            <a:r>
-              <a:rPr lang="en-US" dirty="0" smtClean="0"/>
-              <a:t>RDS</a:t>
-            </a:r>
-          </a:p>
-          <a:p>
-            <a:pPr lvl="1"/>
-            <a:r>
-              <a:rPr lang="en-US" dirty="0" smtClean="0"/>
-              <a:t>MySQL, </a:t>
-            </a:r>
-            <a:r>
-              <a:rPr lang="en-US" dirty="0" err="1" smtClean="0"/>
-              <a:t>PostgreSQL</a:t>
-            </a:r>
-            <a:r>
-              <a:rPr lang="en-US" dirty="0" smtClean="0"/>
-              <a:t>, Microsoft SQL, Oracle</a:t>
-            </a:r>
-          </a:p>
-          <a:p>
-            <a:pPr lvl="1"/>
-            <a:r>
-              <a:rPr lang="en-US" dirty="0" smtClean="0"/>
-              <a:t>Multi-AZ Replication</a:t>
-            </a:r>
-          </a:p>
-          <a:p>
-            <a:r>
-              <a:rPr lang="en-US" dirty="0" err="1"/>
-              <a:t>DynamoDB</a:t>
-            </a:r>
-            <a:endParaRPr lang="en-US" dirty="0"/>
-          </a:p>
-          <a:p>
-            <a:pPr lvl="1"/>
-            <a:r>
-              <a:rPr lang="en-US" dirty="0" err="1" smtClean="0"/>
-              <a:t>NoSQL</a:t>
-            </a:r>
-            <a:r>
-              <a:rPr lang="en-US" dirty="0" smtClean="0"/>
-              <a:t> Database</a:t>
-            </a:r>
-          </a:p>
-          <a:p>
-            <a:pPr lvl="1"/>
-            <a:r>
-              <a:rPr lang="en-US" dirty="0" smtClean="0"/>
-              <a:t>Pay as You Go / Pay for IO</a:t>
-            </a:r>
-          </a:p>
-          <a:p>
-            <a:pPr lvl="1"/>
-            <a:endParaRPr lang="en-US" dirty="0"/>
-          </a:p>
-          <a:p>
-            <a:endParaRPr lang="en-US" dirty="0" smtClean="0"/>
-          </a:p>
-          <a:p>
-            <a:pPr lvl="1"/>
-            <a:endParaRPr lang="en-US" dirty="0" smtClean="0"/>
-          </a:p>
-          <a:p>
-            <a:pPr lvl="1"/>
-            <a:endParaRPr lang="en-US" dirty="0" smtClean="0"/>
-          </a:p>
-        </p:txBody>
-      </p:sp>
-      <p:sp>
-        <p:nvSpPr>
-          <p:cNvPr id="4" name="Content Placeholder 3"/>
-          <p:cNvSpPr>
-            <a:spLocks noGrp="1"/>
-          </p:cNvSpPr>
-          <p:nvPr>
-            <p:ph sz="quarter" idx="14"/>
-          </p:nvPr>
-        </p:nvSpPr>
-        <p:spPr/>
-        <p:txBody>
-          <a:bodyPr>
-            <a:normAutofit fontScale="85000" lnSpcReduction="20000"/>
-          </a:bodyPr>
-          <a:lstStyle/>
-          <a:p>
-            <a:r>
-              <a:rPr lang="en-US" dirty="0"/>
-              <a:t>S3</a:t>
-            </a:r>
-          </a:p>
-          <a:p>
-            <a:pPr lvl="1"/>
-            <a:r>
-              <a:rPr lang="en-US" dirty="0"/>
-              <a:t>Highly </a:t>
-            </a:r>
-            <a:r>
-              <a:rPr lang="en-US" dirty="0" smtClean="0"/>
-              <a:t>Available and </a:t>
-            </a:r>
-            <a:r>
-              <a:rPr lang="en-US" dirty="0"/>
-              <a:t>Highly Durable</a:t>
-            </a:r>
-          </a:p>
-          <a:p>
-            <a:pPr lvl="1"/>
-            <a:r>
-              <a:rPr lang="en-US" dirty="0"/>
-              <a:t>Eventually </a:t>
-            </a:r>
-            <a:r>
-              <a:rPr lang="en-US" dirty="0" smtClean="0"/>
-              <a:t>Consistent</a:t>
-            </a:r>
-          </a:p>
-          <a:p>
-            <a:pPr lvl="1"/>
-            <a:r>
-              <a:rPr lang="en-US" dirty="0" smtClean="0"/>
-              <a:t>Shared Storage</a:t>
-            </a:r>
-          </a:p>
-          <a:p>
-            <a:r>
-              <a:rPr lang="en-US" dirty="0" smtClean="0"/>
-              <a:t>EBS</a:t>
-            </a:r>
-            <a:endParaRPr lang="en-US" dirty="0"/>
-          </a:p>
-          <a:p>
-            <a:pPr lvl="1"/>
-            <a:r>
-              <a:rPr lang="en-US" dirty="0"/>
-              <a:t>Direct Attached Storage</a:t>
-            </a:r>
-          </a:p>
-          <a:p>
-            <a:pPr lvl="1"/>
-            <a:r>
-              <a:rPr lang="en-US" dirty="0"/>
-              <a:t>Single Availability Zone</a:t>
-            </a:r>
-            <a:endParaRPr lang="en-US" dirty="0" smtClean="0"/>
-          </a:p>
-          <a:p>
-            <a:r>
-              <a:rPr lang="en-US" dirty="0" smtClean="0"/>
-              <a:t>EFS</a:t>
-            </a:r>
-            <a:endParaRPr lang="en-US" dirty="0"/>
-          </a:p>
-          <a:p>
-            <a:pPr lvl="1"/>
-            <a:r>
-              <a:rPr lang="en-US" dirty="0"/>
-              <a:t>Not Released Yet</a:t>
-            </a:r>
-          </a:p>
-          <a:p>
-            <a:pPr lvl="1"/>
-            <a:r>
-              <a:rPr lang="en-US" smtClean="0"/>
-              <a:t>Shared Block </a:t>
-            </a:r>
-            <a:r>
-              <a:rPr lang="en-US" dirty="0"/>
-              <a:t>Storage</a:t>
-            </a:r>
-          </a:p>
-        </p:txBody>
-      </p:sp>
+      <p:pic>
+        <p:nvPicPr>
+          <p:cNvPr id="7" name="Picture 6" descr="Typical AWS Architecture.pdf"/>
+          <p:cNvPicPr>
+            <a:picLocks noChangeAspect="1"/>
+          </p:cNvPicPr>
+          <p:nvPr/>
+        </p:nvPicPr>
+        <p:blipFill>
+          <a:blip r:embed="rId3">
+            <a:extLst>
+              <a:ext uri="{28A0092B-C50C-407E-A947-70E740481C1C}">
+                <a14:useLocalDpi xmlns:a14="http://schemas.microsoft.com/office/drawing/2010/main" val="0"/>
+              </a:ext>
+            </a:extLst>
+          </a:blip>
+          <a:stretch>
+            <a:fillRect/>
+          </a:stretch>
+        </p:blipFill>
+        <p:spPr>
+          <a:xfrm>
+            <a:off x="415924" y="2889767"/>
+            <a:ext cx="8308975" cy="3385882"/>
+          </a:xfrm>
+          <a:prstGeom prst="rect">
+            <a:avLst/>
+          </a:prstGeom>
+        </p:spPr>
+      </p:pic>
     </p:spTree>
     <p:extLst>
       <p:ext uri="{BB962C8B-B14F-4D97-AF65-F5344CB8AC3E}">
-        <p14:creationId xmlns:p14="http://schemas.microsoft.com/office/powerpoint/2010/main" val="851895621"/>
+        <p14:creationId xmlns:p14="http://schemas.microsoft.com/office/powerpoint/2010/main" val="1366523385"/>
       </p:ext>
     </p:extLst>
   </p:cSld>
@@ -19985,46 +19740,126 @@
         <p:spPr/>
         <p:txBody>
           <a:bodyPr>
-            <a:normAutofit/>
+            <a:normAutofit fontScale="85000" lnSpcReduction="20000"/>
           </a:bodyPr>
           <a:lstStyle/>
           <a:p>
             <a:r>
               <a:rPr lang="en-US" dirty="0" smtClean="0"/>
-              <a:t>All AWS Resources provide metrics to </a:t>
+              <a:t>ELB: Elastic Load Balancer</a:t>
+            </a:r>
+          </a:p>
+          <a:p>
+            <a:pPr lvl="1"/>
+            <a:r>
+              <a:rPr lang="en-US" dirty="0" smtClean="0"/>
+              <a:t>Immediate Response</a:t>
+            </a:r>
+          </a:p>
+          <a:p>
+            <a:pPr lvl="1"/>
+            <a:r>
+              <a:rPr lang="en-US" dirty="0" smtClean="0"/>
+              <a:t>Distribute Requests amongst  EC2 Instances</a:t>
+            </a:r>
+          </a:p>
+          <a:p>
+            <a:pPr lvl="1"/>
+            <a:r>
+              <a:rPr lang="en-US" dirty="0" smtClean="0"/>
+              <a:t>Built-in </a:t>
             </a:r>
             <a:r>
               <a:rPr lang="en-US" dirty="0" err="1" smtClean="0"/>
               <a:t>CloudWatch</a:t>
             </a:r>
-            <a:endParaRPr lang="en-US" dirty="0" smtClean="0"/>
-          </a:p>
-          <a:p>
             <a:r>
               <a:rPr lang="en-US" dirty="0" smtClean="0"/>
-              <a:t>not all encompassing</a:t>
+              <a:t> Metrics Allow Auto Scaling</a:t>
+            </a:r>
+          </a:p>
+          <a:p>
+            <a:r>
+              <a:rPr lang="en-US" dirty="0" smtClean="0"/>
+              <a:t>SQS: Simple Queue Service</a:t>
             </a:r>
           </a:p>
           <a:p>
             <a:pPr lvl="1"/>
             <a:r>
               <a:rPr lang="en-US" dirty="0" smtClean="0"/>
-              <a:t>Example: no free memory or disk space utilization on EC2</a:t>
-            </a:r>
-          </a:p>
-          <a:p>
+              <a:t>Batch/Delayed Processing</a:t>
+            </a:r>
+          </a:p>
+          <a:p>
+            <a:pPr lvl="1"/>
             <a:r>
               <a:rPr lang="en-US" dirty="0" smtClean="0"/>
-              <a:t>able to be extended through custom metrics</a:t>
-            </a:r>
-          </a:p>
-          <a:p>
+              <a:t>Distribute Tasks amongst EC2 Instances</a:t>
+            </a:r>
+          </a:p>
+          <a:p>
+            <a:pPr lvl="1"/>
             <a:r>
               <a:rPr lang="en-US" dirty="0" smtClean="0"/>
-              <a:t>Works in tandem with AWS Resources – can trigger email alerts or Auto Scaling events</a:t>
-            </a:r>
-          </a:p>
-          <a:p>
+              <a:t>Built-in </a:t>
+            </a:r>
+            <a:r>
+              <a:rPr lang="en-US" dirty="0" err="1" smtClean="0"/>
+              <a:t>CloudWatch</a:t>
+            </a:r>
+            <a:r>
+              <a:rPr lang="en-US" dirty="0" smtClean="0"/>
+              <a:t> Metrics Allow Auto Scaling</a:t>
+            </a:r>
+          </a:p>
+          <a:p>
+            <a:r>
+              <a:rPr lang="en-US" dirty="0" smtClean="0"/>
+              <a:t>Other Ingress Methods:</a:t>
+            </a:r>
+          </a:p>
+          <a:p>
+            <a:pPr lvl="1"/>
+            <a:r>
+              <a:rPr lang="en-US" dirty="0" smtClean="0"/>
+              <a:t>Examples: </a:t>
+            </a:r>
+            <a:r>
+              <a:rPr lang="en-US" dirty="0" err="1" smtClean="0"/>
+              <a:t>ActiveMQ</a:t>
+            </a:r>
+            <a:r>
+              <a:rPr lang="en-US" dirty="0" smtClean="0"/>
+              <a:t>, </a:t>
+            </a:r>
+            <a:r>
+              <a:rPr lang="en-US" dirty="0" err="1" smtClean="0"/>
+              <a:t>Redis</a:t>
+            </a:r>
+            <a:r>
+              <a:rPr lang="en-US" dirty="0" smtClean="0"/>
+              <a:t>, various Proxies</a:t>
+            </a:r>
+          </a:p>
+          <a:p>
+            <a:pPr lvl="1"/>
+            <a:r>
+              <a:rPr lang="en-US" dirty="0" smtClean="0"/>
+              <a:t>If you need to Auto Scale, </a:t>
+            </a:r>
+            <a:r>
+              <a:rPr lang="en-US" smtClean="0"/>
+              <a:t>create custom </a:t>
+            </a:r>
+            <a:r>
+              <a:rPr lang="en-US" dirty="0" err="1" smtClean="0"/>
+              <a:t>CloudWatch</a:t>
+            </a:r>
+            <a:r>
+              <a:rPr lang="en-US" dirty="0" smtClean="0"/>
+              <a:t> Metrics</a:t>
+            </a:r>
             <a:endParaRPr lang="en-US" dirty="0"/>
           </a:p>
         </p:txBody>
@@ -20048,11 +19883,7 @@
           <a:p>
             <a:r>
               <a:rPr lang="en-US" dirty="0" smtClean="0"/>
-              <a:t>Monitoring: </a:t>
-            </a:r>
-            <a:r>
-              <a:rPr lang="en-US" dirty="0" err="1" smtClean="0"/>
-              <a:t>CloudWatch</a:t>
+              <a:t>Ingress: ELB, SQS or Other</a:t>
             </a:r>
             <a:endParaRPr lang="en-US" dirty="0"/>
           </a:p>
@@ -20061,7 +19892,7 @@
     </p:spTree>
     <p:extLst>
       <p:ext uri="{BB962C8B-B14F-4D97-AF65-F5344CB8AC3E}">
-        <p14:creationId xmlns:p14="http://schemas.microsoft.com/office/powerpoint/2010/main" val="3793609257"/>
+        <p14:creationId xmlns:p14="http://schemas.microsoft.com/office/powerpoint/2010/main" val="3119918725"/>
       </p:ext>
     </p:extLst>
   </p:cSld>
@@ -20105,58 +19936,6 @@
       </p:grpSpPr>
       <p:sp>
         <p:nvSpPr>
-          <p:cNvPr id="3" name="Content Placeholder 2"/>
-          <p:cNvSpPr>
-            <a:spLocks noGrp="1"/>
-          </p:cNvSpPr>
-          <p:nvPr>
-            <p:ph idx="1"/>
-          </p:nvPr>
-        </p:nvSpPr>
-        <p:spPr/>
-        <p:txBody>
-          <a:bodyPr>
-            <a:normAutofit/>
-          </a:bodyPr>
-          <a:lstStyle/>
-          <a:p>
-            <a:pPr lvl="1"/>
-            <a:r>
-              <a:rPr lang="en-US" dirty="0" smtClean="0"/>
-              <a:t>Ingress: ELB, SQS or other Ingress</a:t>
-            </a:r>
-          </a:p>
-          <a:p>
-            <a:pPr lvl="1"/>
-            <a:r>
-              <a:rPr lang="en-US" dirty="0" smtClean="0"/>
-              <a:t>Compute: Elastic Instances</a:t>
-            </a:r>
-          </a:p>
-          <a:p>
-            <a:pPr lvl="1"/>
-            <a:r>
-              <a:rPr lang="en-US" dirty="0" smtClean="0"/>
-              <a:t>Data Storage: RDS, S3, </a:t>
-            </a:r>
-            <a:r>
-              <a:rPr lang="en-US" dirty="0" err="1" smtClean="0"/>
-              <a:t>DynamoDB</a:t>
-            </a:r>
-            <a:r>
-              <a:rPr lang="en-US" dirty="0"/>
-              <a:t> </a:t>
-            </a:r>
-            <a:r>
-              <a:rPr lang="en-US" dirty="0" smtClean="0"/>
-              <a:t>or other Data Storage</a:t>
-            </a:r>
-            <a:endParaRPr lang="en-US" dirty="0"/>
-          </a:p>
-        </p:txBody>
-      </p:sp>
-      <p:sp>
-        <p:nvSpPr>
           <p:cNvPr id="2" name="Title 1"/>
           <p:cNvSpPr>
             <a:spLocks noGrp="1"/>
@@ -20174,23 +19953,222 @@
           <a:p>
             <a:r>
               <a:rPr lang="en-US" dirty="0" smtClean="0"/>
-              <a:t>AWS Architecture:</a:t>
+              <a:t>Data Storage: RDS, </a:t>
+            </a:r>
+            <a:r>
+              <a:rPr lang="en-US" dirty="0" err="1" smtClean="0"/>
+              <a:t>DynamoDB</a:t>
+            </a:r>
+            <a:r>
+              <a:rPr lang="en-US" dirty="0" smtClean="0"/>
+              <a:t>,</a:t>
             </a:r>
             <a:br>
               <a:rPr lang="en-US" dirty="0" smtClean="0"/>
             </a:br>
             <a:r>
               <a:rPr lang="en-US" dirty="0" smtClean="0"/>
-              <a:t>Typical Data Flow</a:t>
+              <a:t>S3, EBS and EFS</a:t>
             </a:r>
             <a:endParaRPr lang="en-US" dirty="0"/>
+          </a:p>
+        </p:txBody>
+      </p:sp>
+      <p:sp>
+        <p:nvSpPr>
+          <p:cNvPr id="3" name="Content Placeholder 2"/>
+          <p:cNvSpPr>
+            <a:spLocks noGrp="1"/>
+          </p:cNvSpPr>
+          <p:nvPr>
+            <p:ph sz="quarter" idx="13"/>
+          </p:nvPr>
+        </p:nvSpPr>
+        <p:spPr/>
+        <p:txBody>
+          <a:bodyPr>
+            <a:normAutofit/>
+          </a:bodyPr>
+          <a:lstStyle/>
+          <a:p>
+            <a:r>
+              <a:rPr lang="en-US" dirty="0" smtClean="0"/>
+              <a:t>RDS</a:t>
+            </a:r>
+          </a:p>
+          <a:p>
+            <a:pPr lvl="1"/>
+            <a:r>
+              <a:rPr lang="en-US" dirty="0" smtClean="0"/>
+              <a:t>MySQL, </a:t>
+            </a:r>
+            <a:r>
+              <a:rPr lang="en-US" dirty="0" err="1" smtClean="0"/>
+              <a:t>PostgreSQL</a:t>
+            </a:r>
+            <a:r>
+              <a:rPr lang="en-US" dirty="0" smtClean="0"/>
+              <a:t>, Microsoft SQL, Oracle</a:t>
+            </a:r>
+          </a:p>
+          <a:p>
+            <a:pPr lvl="1"/>
+            <a:r>
+              <a:rPr lang="en-US" dirty="0" smtClean="0"/>
+              <a:t>Multi-AZ Replication</a:t>
+            </a:r>
+          </a:p>
+          <a:p>
+            <a:r>
+              <a:rPr lang="en-US" dirty="0" err="1"/>
+              <a:t>DynamoDB</a:t>
+            </a:r>
+            <a:endParaRPr lang="en-US" dirty="0"/>
+          </a:p>
+          <a:p>
+            <a:pPr lvl="1"/>
+            <a:r>
+              <a:rPr lang="en-US" dirty="0" err="1" smtClean="0"/>
+              <a:t>NoSQL</a:t>
+            </a:r>
+            <a:r>
+              <a:rPr lang="en-US" dirty="0" smtClean="0"/>
+              <a:t> Database</a:t>
+            </a:r>
+          </a:p>
+          <a:p>
+            <a:pPr lvl="1"/>
+            <a:r>
+              <a:rPr lang="en-US" dirty="0" smtClean="0"/>
+              <a:t>Pay as You Go / Pay for IO</a:t>
+            </a:r>
+          </a:p>
+          <a:p>
+            <a:pPr lvl="1"/>
+            <a:endParaRPr lang="en-US" dirty="0"/>
+          </a:p>
+          <a:p>
+            <a:endParaRPr lang="en-US" dirty="0" smtClean="0"/>
+          </a:p>
+          <a:p>
+            <a:pPr lvl="1"/>
+            <a:endParaRPr lang="en-US" dirty="0" smtClean="0"/>
+          </a:p>
+          <a:p>
+            <a:pPr lvl="1"/>
+            <a:endParaRPr lang="en-US" dirty="0" smtClean="0"/>
+          </a:p>
+        </p:txBody>
+      </p:sp>
+      <p:sp>
+        <p:nvSpPr>
+          <p:cNvPr id="4" name="Content Placeholder 3"/>
+          <p:cNvSpPr>
+            <a:spLocks noGrp="1"/>
+          </p:cNvSpPr>
+          <p:nvPr>
+            <p:ph sz="quarter" idx="14"/>
+          </p:nvPr>
+        </p:nvSpPr>
+        <p:spPr/>
+        <p:txBody>
+          <a:bodyPr>
+            <a:normAutofit fontScale="85000" lnSpcReduction="20000"/>
+          </a:bodyPr>
+          <a:lstStyle/>
+          <a:p>
+            <a:r>
+              <a:rPr lang="en-US" dirty="0"/>
+              <a:t>S3</a:t>
+            </a:r>
+          </a:p>
+          <a:p>
+            <a:pPr lvl="1"/>
+            <a:r>
+              <a:rPr lang="en-US" dirty="0"/>
+              <a:t>Highly </a:t>
+            </a:r>
+            <a:r>
+              <a:rPr lang="en-US" dirty="0" smtClean="0"/>
+              <a:t>Available and </a:t>
+            </a:r>
+            <a:r>
+              <a:rPr lang="en-US" dirty="0"/>
+              <a:t>Highly Durable</a:t>
+            </a:r>
+          </a:p>
+          <a:p>
+            <a:pPr lvl="1"/>
+            <a:r>
+              <a:rPr lang="en-US" dirty="0"/>
+              <a:t>Eventually </a:t>
+            </a:r>
+            <a:r>
+              <a:rPr lang="en-US" dirty="0" smtClean="0"/>
+              <a:t>Consistent</a:t>
+            </a:r>
+          </a:p>
+          <a:p>
+            <a:pPr lvl="1"/>
+            <a:r>
+              <a:rPr lang="en-US" dirty="0" smtClean="0"/>
+              <a:t>Shared Storage</a:t>
+            </a:r>
+          </a:p>
+          <a:p>
+            <a:r>
+              <a:rPr lang="en-US" dirty="0" smtClean="0"/>
+              <a:t>EBS</a:t>
+            </a:r>
+            <a:endParaRPr lang="en-US" dirty="0"/>
+          </a:p>
+          <a:p>
+            <a:pPr lvl="1"/>
+            <a:r>
+              <a:rPr lang="en-US" dirty="0"/>
+              <a:t>Direct Attached Storage</a:t>
+            </a:r>
+          </a:p>
+          <a:p>
+            <a:pPr lvl="1"/>
+            <a:r>
+              <a:rPr lang="en-US" dirty="0"/>
+              <a:t>Single Availability Zone</a:t>
+            </a:r>
+            <a:endParaRPr lang="en-US" dirty="0" smtClean="0"/>
+          </a:p>
+          <a:p>
+            <a:r>
+              <a:rPr lang="en-US" dirty="0" smtClean="0"/>
+              <a:t>EFS</a:t>
+            </a:r>
+            <a:endParaRPr lang="en-US" dirty="0"/>
+          </a:p>
+          <a:p>
+            <a:pPr lvl="1"/>
+            <a:r>
+              <a:rPr lang="en-US" dirty="0" smtClean="0"/>
+              <a:t>Currently in Preview</a:t>
+            </a:r>
+            <a:endParaRPr lang="en-US" dirty="0"/>
+          </a:p>
+          <a:p>
+            <a:pPr lvl="1"/>
+            <a:r>
+              <a:rPr lang="en-US" dirty="0" smtClean="0"/>
+              <a:t>Shared Block </a:t>
+            </a:r>
+            <a:r>
+              <a:rPr lang="en-US" dirty="0"/>
+              <a:t>Storage</a:t>
+            </a:r>
           </a:p>
         </p:txBody>
       </p:sp>
     </p:spTree>
     <p:extLst>
       <p:ext uri="{BB962C8B-B14F-4D97-AF65-F5344CB8AC3E}">
-        <p14:creationId xmlns:p14="http://schemas.microsoft.com/office/powerpoint/2010/main" val="1959491456"/>
+        <p14:creationId xmlns:p14="http://schemas.microsoft.com/office/powerpoint/2010/main" val="851895621"/>
       </p:ext>
     </p:extLst>
   </p:cSld>
@@ -20234,6 +20212,63 @@
       </p:grpSpPr>
       <p:sp>
         <p:nvSpPr>
+          <p:cNvPr id="3" name="Content Placeholder 2"/>
+          <p:cNvSpPr>
+            <a:spLocks noGrp="1"/>
+          </p:cNvSpPr>
+          <p:nvPr>
+            <p:ph idx="1"/>
+          </p:nvPr>
+        </p:nvSpPr>
+        <p:spPr/>
+        <p:txBody>
+          <a:bodyPr>
+            <a:normAutofit/>
+          </a:bodyPr>
+          <a:lstStyle/>
+          <a:p>
+            <a:r>
+              <a:rPr lang="en-US" dirty="0" smtClean="0"/>
+              <a:t>All AWS Resources provide metrics to </a:t>
+            </a:r>
+            <a:r>
+              <a:rPr lang="en-US" dirty="0" err="1" smtClean="0"/>
+              <a:t>CloudWatch</a:t>
+            </a:r>
+            <a:endParaRPr lang="en-US" dirty="0" smtClean="0"/>
+          </a:p>
+          <a:p>
+            <a:r>
+              <a:rPr lang="en-US" dirty="0" smtClean="0"/>
+              <a:t>not all encompassing</a:t>
+            </a:r>
+          </a:p>
+          <a:p>
+            <a:pPr lvl="1"/>
+            <a:r>
+              <a:rPr lang="en-US" dirty="0" smtClean="0"/>
+              <a:t>Example: no free memory or disk space utilization on EC2</a:t>
+            </a:r>
+          </a:p>
+          <a:p>
+            <a:r>
+              <a:rPr lang="en-US" dirty="0" smtClean="0"/>
+              <a:t>able to be extended through custom metrics</a:t>
+            </a:r>
+          </a:p>
+          <a:p>
+            <a:r>
+              <a:rPr lang="en-US" dirty="0" smtClean="0"/>
+              <a:t>Works in tandem with AWS Resources – can trigger email alerts or Auto Scaling events</a:t>
+            </a:r>
+          </a:p>
+          <a:p>
+            <a:endParaRPr lang="en-US" dirty="0"/>
+          </a:p>
+        </p:txBody>
+      </p:sp>
+      <p:sp>
+        <p:nvSpPr>
           <p:cNvPr id="2" name="Title 1"/>
           <p:cNvSpPr>
             <a:spLocks noGrp="1"/>
@@ -20245,59 +20280,26 @@
         <p:spPr/>
         <p:txBody>
           <a:bodyPr>
-            <a:normAutofit fontScale="90000"/>
+            <a:normAutofit/>
           </a:bodyPr>
           <a:lstStyle/>
           <a:p>
             <a:r>
               <a:rPr lang="en-US" dirty="0" smtClean="0"/>
-              <a:t>AWS Architecture:</a:t>
-            </a:r>
-            <a:br>
-              <a:rPr lang="en-US" dirty="0" smtClean="0"/>
-            </a:br>
-            <a:r>
-              <a:rPr lang="en-US" dirty="0" smtClean="0"/>
-              <a:t>Typical Data Flow</a:t>
+              <a:t>Monitoring: </a:t>
+            </a:r>
+            <a:r>
+              <a:rPr lang="en-US" dirty="0" err="1" smtClean="0"/>
+              <a:t>CloudWatch</a:t>
             </a:r>
             <a:endParaRPr lang="en-US" dirty="0"/>
           </a:p>
         </p:txBody>
       </p:sp>
-      <p:pic>
-        <p:nvPicPr>
-          <p:cNvPr id="7" name="Picture 6" descr="Typical AWS Architecture.pdf"/>
-          <p:cNvPicPr>
-            <a:picLocks noChangeAspect="1"/>
-          </p:cNvPicPr>
-          <p:nvPr/>
-        </p:nvPicPr>
-        <p:blipFill>
-          <a:blip r:embed="rId3">
-            <a:extLst>
-              <a:ext uri="{28A0092B-C50C-407E-A947-70E740481C1C}">
-                <a14:useLocalDpi xmlns:a14="http://schemas.microsoft.com/office/drawing/2010/main" val="0"/>
-              </a:ext>
-            </a:extLst>
-          </a:blip>
-          <a:stretch>
-            <a:fillRect/>
-          </a:stretch>
-        </p:blipFill>
-        <p:spPr>
-          <a:xfrm>
-            <a:off x="415924" y="2889767"/>
-            <a:ext cx="8308975" cy="3385882"/>
-          </a:xfrm>
-          <a:prstGeom prst="rect">
-            <a:avLst/>
-          </a:prstGeom>
-        </p:spPr>
-      </p:pic>
     </p:spTree>
     <p:extLst>
       <p:ext uri="{BB962C8B-B14F-4D97-AF65-F5344CB8AC3E}">
-        <p14:creationId xmlns:p14="http://schemas.microsoft.com/office/powerpoint/2010/main" val="1366523385"/>
+        <p14:creationId xmlns:p14="http://schemas.microsoft.com/office/powerpoint/2010/main" val="3793609257"/>
       </p:ext>
     </p:extLst>
   </p:cSld>

</xml_diff>